<commit_message>
finish LDA hands on
</commit_message>
<xml_diff>
--- a/sprint3_retrieval/module3_retrieval.pptx
+++ b/sprint3_retrieval/module3_retrieval.pptx
@@ -302,7 +302,7 @@
           <a:p>
             <a:fld id="{72ED09F7-DFA5-7F4B-8B47-DAE36D9161CE}" type="datetimeFigureOut">
               <a:rPr lang="en-US" smtClean="0"/>
-              <a:t>3/29/20</a:t>
+              <a:t>4/3/20</a:t>
             </a:fld>
             <a:endParaRPr lang="en-US"/>
           </a:p>
@@ -500,7 +500,7 @@
           <a:p>
             <a:fld id="{72ED09F7-DFA5-7F4B-8B47-DAE36D9161CE}" type="datetimeFigureOut">
               <a:rPr lang="en-US" smtClean="0"/>
-              <a:t>3/29/20</a:t>
+              <a:t>4/3/20</a:t>
             </a:fld>
             <a:endParaRPr lang="en-US"/>
           </a:p>
@@ -708,7 +708,7 @@
           <a:p>
             <a:fld id="{72ED09F7-DFA5-7F4B-8B47-DAE36D9161CE}" type="datetimeFigureOut">
               <a:rPr lang="en-US" smtClean="0"/>
-              <a:t>3/29/20</a:t>
+              <a:t>4/3/20</a:t>
             </a:fld>
             <a:endParaRPr lang="en-US"/>
           </a:p>
@@ -906,7 +906,7 @@
           <a:p>
             <a:fld id="{72ED09F7-DFA5-7F4B-8B47-DAE36D9161CE}" type="datetimeFigureOut">
               <a:rPr lang="en-US" smtClean="0"/>
-              <a:t>3/29/20</a:t>
+              <a:t>4/3/20</a:t>
             </a:fld>
             <a:endParaRPr lang="en-US"/>
           </a:p>
@@ -1181,7 +1181,7 @@
           <a:p>
             <a:fld id="{72ED09F7-DFA5-7F4B-8B47-DAE36D9161CE}" type="datetimeFigureOut">
               <a:rPr lang="en-US" smtClean="0"/>
-              <a:t>3/29/20</a:t>
+              <a:t>4/3/20</a:t>
             </a:fld>
             <a:endParaRPr lang="en-US"/>
           </a:p>
@@ -1446,7 +1446,7 @@
           <a:p>
             <a:fld id="{72ED09F7-DFA5-7F4B-8B47-DAE36D9161CE}" type="datetimeFigureOut">
               <a:rPr lang="en-US" smtClean="0"/>
-              <a:t>3/29/20</a:t>
+              <a:t>4/3/20</a:t>
             </a:fld>
             <a:endParaRPr lang="en-US"/>
           </a:p>
@@ -1858,7 +1858,7 @@
           <a:p>
             <a:fld id="{72ED09F7-DFA5-7F4B-8B47-DAE36D9161CE}" type="datetimeFigureOut">
               <a:rPr lang="en-US" smtClean="0"/>
-              <a:t>3/29/20</a:t>
+              <a:t>4/3/20</a:t>
             </a:fld>
             <a:endParaRPr lang="en-US"/>
           </a:p>
@@ -1999,7 +1999,7 @@
           <a:p>
             <a:fld id="{72ED09F7-DFA5-7F4B-8B47-DAE36D9161CE}" type="datetimeFigureOut">
               <a:rPr lang="en-US" smtClean="0"/>
-              <a:t>3/29/20</a:t>
+              <a:t>4/3/20</a:t>
             </a:fld>
             <a:endParaRPr lang="en-US"/>
           </a:p>
@@ -2112,7 +2112,7 @@
           <a:p>
             <a:fld id="{72ED09F7-DFA5-7F4B-8B47-DAE36D9161CE}" type="datetimeFigureOut">
               <a:rPr lang="en-US" smtClean="0"/>
-              <a:t>3/29/20</a:t>
+              <a:t>4/3/20</a:t>
             </a:fld>
             <a:endParaRPr lang="en-US"/>
           </a:p>
@@ -2423,7 +2423,7 @@
           <a:p>
             <a:fld id="{72ED09F7-DFA5-7F4B-8B47-DAE36D9161CE}" type="datetimeFigureOut">
               <a:rPr lang="en-US" smtClean="0"/>
-              <a:t>3/29/20</a:t>
+              <a:t>4/3/20</a:t>
             </a:fld>
             <a:endParaRPr lang="en-US"/>
           </a:p>
@@ -2711,7 +2711,7 @@
           <a:p>
             <a:fld id="{72ED09F7-DFA5-7F4B-8B47-DAE36D9161CE}" type="datetimeFigureOut">
               <a:rPr lang="en-US" smtClean="0"/>
-              <a:t>3/29/20</a:t>
+              <a:t>4/3/20</a:t>
             </a:fld>
             <a:endParaRPr lang="en-US"/>
           </a:p>
@@ -2952,7 +2952,7 @@
           <a:p>
             <a:fld id="{72ED09F7-DFA5-7F4B-8B47-DAE36D9161CE}" type="datetimeFigureOut">
               <a:rPr lang="en-US" smtClean="0"/>
-              <a:t>3/29/20</a:t>
+              <a:t>4/3/20</a:t>
             </a:fld>
             <a:endParaRPr lang="en-US"/>
           </a:p>
@@ -30860,7 +30860,15 @@
             </a:r>
             <a:r>
               <a:rPr lang="fr-FR" sz="2400" dirty="0"/>
-              <a:t> all documents </a:t>
+              <a:t> </a:t>
+            </a:r>
+            <a:r>
+              <a:rPr lang="fr-FR" sz="2400" dirty="0" err="1"/>
+              <a:t>another</a:t>
+            </a:r>
+            <a:r>
+              <a:rPr lang="fr-FR" sz="2400" dirty="0"/>
+              <a:t> document </a:t>
             </a:r>
             <a:r>
               <a:rPr lang="fr-FR" sz="2400" dirty="0" err="1"/>
@@ -30868,7 +30876,15 @@
             </a:r>
             <a:r>
               <a:rPr lang="fr-FR" sz="2400" dirty="0"/>
-              <a:t> are on </a:t>
+              <a:t> </a:t>
+            </a:r>
+            <a:r>
+              <a:rPr lang="fr-FR" sz="2400" dirty="0" err="1"/>
+              <a:t>is</a:t>
+            </a:r>
+            <a:r>
+              <a:rPr lang="fr-FR" sz="2400" dirty="0"/>
+              <a:t> on </a:t>
             </a:r>
             <a:r>
               <a:rPr lang="fr-FR" sz="2400" dirty="0" err="1"/>

</xml_diff>